<commit_message>
feat(deeprad): add run_traintest2 for transfer learning.
</commit_message>
<xml_diff>
--- a/paper_imgs/ppt_cheat.pptx
+++ b/paper_imgs/ppt_cheat.pptx
@@ -6,6 +6,11 @@
   </p:sldMasterIdLst>
   <p:sldIdLst>
     <p:sldId id="256" r:id="rId2"/>
+    <p:sldId id="260" r:id="rId3"/>
+    <p:sldId id="261" r:id="rId4"/>
+    <p:sldId id="257" r:id="rId5"/>
+    <p:sldId id="259" r:id="rId6"/>
+    <p:sldId id="258" r:id="rId7"/>
   </p:sldIdLst>
   <p:sldSz cx="12192000" cy="6858000"/>
   <p:notesSz cx="6858000" cy="9144000"/>
@@ -104,6 +109,11 @@
       </a:defRPr>
     </a:lvl9pPr>
   </p:defaultTextStyle>
+  <p:extLst>
+    <p:ext uri="{EFAFB233-063F-42B5-8137-9DF3F51BA10A}">
+      <p15:sldGuideLst xmlns:p15="http://schemas.microsoft.com/office/powerpoint/2012/main"/>
+    </p:ext>
+  </p:extLst>
 </p:presentation>
 </file>
 
@@ -254,7 +264,7 @@
           <a:p>
             <a:fld id="{7F1CDC01-110D-4FC1-BCA8-6CCDE4344D1A}" type="datetimeFigureOut">
               <a:rPr lang="en-US" smtClean="0"/>
-              <a:t>5/5/2021</a:t>
+              <a:t>5/6/2021</a:t>
             </a:fld>
             <a:endParaRPr lang="en-US"/>
           </a:p>
@@ -452,7 +462,7 @@
           <a:p>
             <a:fld id="{7F1CDC01-110D-4FC1-BCA8-6CCDE4344D1A}" type="datetimeFigureOut">
               <a:rPr lang="en-US" smtClean="0"/>
-              <a:t>5/5/2021</a:t>
+              <a:t>5/6/2021</a:t>
             </a:fld>
             <a:endParaRPr lang="en-US"/>
           </a:p>
@@ -660,7 +670,7 @@
           <a:p>
             <a:fld id="{7F1CDC01-110D-4FC1-BCA8-6CCDE4344D1A}" type="datetimeFigureOut">
               <a:rPr lang="en-US" smtClean="0"/>
-              <a:t>5/5/2021</a:t>
+              <a:t>5/6/2021</a:t>
             </a:fld>
             <a:endParaRPr lang="en-US"/>
           </a:p>
@@ -858,7 +868,7 @@
           <a:p>
             <a:fld id="{7F1CDC01-110D-4FC1-BCA8-6CCDE4344D1A}" type="datetimeFigureOut">
               <a:rPr lang="en-US" smtClean="0"/>
-              <a:t>5/5/2021</a:t>
+              <a:t>5/6/2021</a:t>
             </a:fld>
             <a:endParaRPr lang="en-US"/>
           </a:p>
@@ -1133,7 +1143,7 @@
           <a:p>
             <a:fld id="{7F1CDC01-110D-4FC1-BCA8-6CCDE4344D1A}" type="datetimeFigureOut">
               <a:rPr lang="en-US" smtClean="0"/>
-              <a:t>5/5/2021</a:t>
+              <a:t>5/6/2021</a:t>
             </a:fld>
             <a:endParaRPr lang="en-US"/>
           </a:p>
@@ -1398,7 +1408,7 @@
           <a:p>
             <a:fld id="{7F1CDC01-110D-4FC1-BCA8-6CCDE4344D1A}" type="datetimeFigureOut">
               <a:rPr lang="en-US" smtClean="0"/>
-              <a:t>5/5/2021</a:t>
+              <a:t>5/6/2021</a:t>
             </a:fld>
             <a:endParaRPr lang="en-US"/>
           </a:p>
@@ -1810,7 +1820,7 @@
           <a:p>
             <a:fld id="{7F1CDC01-110D-4FC1-BCA8-6CCDE4344D1A}" type="datetimeFigureOut">
               <a:rPr lang="en-US" smtClean="0"/>
-              <a:t>5/5/2021</a:t>
+              <a:t>5/6/2021</a:t>
             </a:fld>
             <a:endParaRPr lang="en-US"/>
           </a:p>
@@ -1951,7 +1961,7 @@
           <a:p>
             <a:fld id="{7F1CDC01-110D-4FC1-BCA8-6CCDE4344D1A}" type="datetimeFigureOut">
               <a:rPr lang="en-US" smtClean="0"/>
-              <a:t>5/5/2021</a:t>
+              <a:t>5/6/2021</a:t>
             </a:fld>
             <a:endParaRPr lang="en-US"/>
           </a:p>
@@ -2064,7 +2074,7 @@
           <a:p>
             <a:fld id="{7F1CDC01-110D-4FC1-BCA8-6CCDE4344D1A}" type="datetimeFigureOut">
               <a:rPr lang="en-US" smtClean="0"/>
-              <a:t>5/5/2021</a:t>
+              <a:t>5/6/2021</a:t>
             </a:fld>
             <a:endParaRPr lang="en-US"/>
           </a:p>
@@ -2375,7 +2385,7 @@
           <a:p>
             <a:fld id="{7F1CDC01-110D-4FC1-BCA8-6CCDE4344D1A}" type="datetimeFigureOut">
               <a:rPr lang="en-US" smtClean="0"/>
-              <a:t>5/5/2021</a:t>
+              <a:t>5/6/2021</a:t>
             </a:fld>
             <a:endParaRPr lang="en-US"/>
           </a:p>
@@ -2663,7 +2673,7 @@
           <a:p>
             <a:fld id="{7F1CDC01-110D-4FC1-BCA8-6CCDE4344D1A}" type="datetimeFigureOut">
               <a:rPr lang="en-US" smtClean="0"/>
-              <a:t>5/5/2021</a:t>
+              <a:t>5/6/2021</a:t>
             </a:fld>
             <a:endParaRPr lang="en-US"/>
           </a:p>
@@ -2904,7 +2914,7 @@
           <a:p>
             <a:fld id="{7F1CDC01-110D-4FC1-BCA8-6CCDE4344D1A}" type="datetimeFigureOut">
               <a:rPr lang="en-US" smtClean="0"/>
-              <a:t>5/5/2021</a:t>
+              <a:t>5/6/2021</a:t>
             </a:fld>
             <a:endParaRPr lang="en-US"/>
           </a:p>
@@ -3478,6 +3488,870 @@
 </p:sld>
 </file>
 
+<file path=ppt/slides/slide2.xml><?xml version="1.0" encoding="utf-8"?>
+<p:sld xmlns:a="http://schemas.openxmlformats.org/drawingml/2006/main" xmlns:r="http://schemas.openxmlformats.org/officeDocument/2006/relationships" xmlns:p="http://schemas.openxmlformats.org/presentationml/2006/main">
+  <p:cSld>
+    <p:spTree>
+      <p:nvGrpSpPr>
+        <p:cNvPr id="1" name=""/>
+        <p:cNvGrpSpPr/>
+        <p:nvPr/>
+      </p:nvGrpSpPr>
+      <p:grpSpPr>
+        <a:xfrm>
+          <a:off x="0" y="0"/>
+          <a:ext cx="0" cy="0"/>
+          <a:chOff x="0" y="0"/>
+          <a:chExt cx="0" cy="0"/>
+        </a:xfrm>
+      </p:grpSpPr>
+      <p:pic>
+        <p:nvPicPr>
+          <p:cNvPr id="3" name="Picture 2">
+            <a:extLst>
+              <a:ext uri="{FF2B5EF4-FFF2-40B4-BE49-F238E27FC236}">
+                <a16:creationId xmlns:a16="http://schemas.microsoft.com/office/drawing/2014/main" id="{23784066-801F-421E-9955-D79291FEAB0C}"/>
+              </a:ext>
+            </a:extLst>
+          </p:cNvPr>
+          <p:cNvPicPr>
+            <a:picLocks noChangeAspect="1"/>
+          </p:cNvPicPr>
+          <p:nvPr/>
+        </p:nvPicPr>
+        <p:blipFill rotWithShape="1">
+          <a:blip r:embed="rId2">
+            <a:extLst>
+              <a:ext uri="{28A0092B-C50C-407E-A947-70E740481C1C}">
+                <a14:useLocalDpi xmlns:a14="http://schemas.microsoft.com/office/drawing/2010/main" val="0"/>
+              </a:ext>
+            </a:extLst>
+          </a:blip>
+          <a:srcRect r="20309"/>
+          <a:stretch/>
+        </p:blipFill>
+        <p:spPr>
+          <a:xfrm>
+            <a:off x="1853968" y="688029"/>
+            <a:ext cx="9715991" cy="1219200"/>
+          </a:xfrm>
+          <a:prstGeom prst="rect">
+            <a:avLst/>
+          </a:prstGeom>
+        </p:spPr>
+      </p:pic>
+      <p:sp>
+        <p:nvSpPr>
+          <p:cNvPr id="12" name="TextBox 11">
+            <a:extLst>
+              <a:ext uri="{FF2B5EF4-FFF2-40B4-BE49-F238E27FC236}">
+                <a16:creationId xmlns:a16="http://schemas.microsoft.com/office/drawing/2014/main" id="{A0A20F8C-D201-4D76-99FE-C0AB6BF800FF}"/>
+              </a:ext>
+            </a:extLst>
+          </p:cNvPr>
+          <p:cNvSpPr txBox="1"/>
+          <p:nvPr/>
+        </p:nvSpPr>
+        <p:spPr>
+          <a:xfrm>
+            <a:off x="352338" y="762647"/>
+            <a:ext cx="1602297" cy="369332"/>
+          </a:xfrm>
+          <a:prstGeom prst="rect">
+            <a:avLst/>
+          </a:prstGeom>
+          <a:noFill/>
+        </p:spPr>
+        <p:txBody>
+          <a:bodyPr wrap="square" rtlCol="0">
+            <a:spAutoFit/>
+          </a:bodyPr>
+          <a:lstStyle/>
+          <a:p>
+            <a:pPr algn="r"/>
+            <a:r>
+              <a:rPr lang="en-US" dirty="0"/>
+              <a:t>Input 1</a:t>
+            </a:r>
+          </a:p>
+        </p:txBody>
+      </p:sp>
+      <p:sp>
+        <p:nvSpPr>
+          <p:cNvPr id="13" name="TextBox 12">
+            <a:extLst>
+              <a:ext uri="{FF2B5EF4-FFF2-40B4-BE49-F238E27FC236}">
+                <a16:creationId xmlns:a16="http://schemas.microsoft.com/office/drawing/2014/main" id="{89C7D9C8-FD28-42F0-A5BB-D461D979A131}"/>
+              </a:ext>
+            </a:extLst>
+          </p:cNvPr>
+          <p:cNvSpPr txBox="1"/>
+          <p:nvPr/>
+        </p:nvSpPr>
+        <p:spPr>
+          <a:xfrm>
+            <a:off x="394283" y="4096738"/>
+            <a:ext cx="1602297" cy="369332"/>
+          </a:xfrm>
+          <a:prstGeom prst="rect">
+            <a:avLst/>
+          </a:prstGeom>
+          <a:noFill/>
+        </p:spPr>
+        <p:txBody>
+          <a:bodyPr wrap="square" rtlCol="0">
+            <a:spAutoFit/>
+          </a:bodyPr>
+          <a:lstStyle/>
+          <a:p>
+            <a:pPr algn="r"/>
+            <a:r>
+              <a:rPr lang="en-US" dirty="0"/>
+              <a:t>Output</a:t>
+            </a:r>
+          </a:p>
+        </p:txBody>
+      </p:sp>
+      <p:pic>
+        <p:nvPicPr>
+          <p:cNvPr id="37" name="Picture 36">
+            <a:extLst>
+              <a:ext uri="{FF2B5EF4-FFF2-40B4-BE49-F238E27FC236}">
+                <a16:creationId xmlns:a16="http://schemas.microsoft.com/office/drawing/2014/main" id="{326FF194-B974-40BB-A2B0-9E94096B48E3}"/>
+              </a:ext>
+            </a:extLst>
+          </p:cNvPr>
+          <p:cNvPicPr>
+            <a:picLocks noChangeAspect="1"/>
+          </p:cNvPicPr>
+          <p:nvPr/>
+        </p:nvPicPr>
+        <p:blipFill rotWithShape="1">
+          <a:blip r:embed="rId3">
+            <a:extLst>
+              <a:ext uri="{28A0092B-C50C-407E-A947-70E740481C1C}">
+                <a14:useLocalDpi xmlns:a14="http://schemas.microsoft.com/office/drawing/2010/main" val="0"/>
+              </a:ext>
+            </a:extLst>
+          </a:blip>
+          <a:srcRect r="19318"/>
+          <a:stretch/>
+        </p:blipFill>
+        <p:spPr>
+          <a:xfrm>
+            <a:off x="1853968" y="1990035"/>
+            <a:ext cx="9836679" cy="1219200"/>
+          </a:xfrm>
+          <a:prstGeom prst="rect">
+            <a:avLst/>
+          </a:prstGeom>
+        </p:spPr>
+      </p:pic>
+      <p:pic>
+        <p:nvPicPr>
+          <p:cNvPr id="39" name="Picture 38">
+            <a:extLst>
+              <a:ext uri="{FF2B5EF4-FFF2-40B4-BE49-F238E27FC236}">
+                <a16:creationId xmlns:a16="http://schemas.microsoft.com/office/drawing/2014/main" id="{40EF6907-E92C-45E7-A363-C95EF6B13702}"/>
+              </a:ext>
+            </a:extLst>
+          </p:cNvPr>
+          <p:cNvPicPr>
+            <a:picLocks noChangeAspect="1"/>
+          </p:cNvPicPr>
+          <p:nvPr/>
+        </p:nvPicPr>
+        <p:blipFill rotWithShape="1">
+          <a:blip r:embed="rId4">
+            <a:extLst>
+              <a:ext uri="{28A0092B-C50C-407E-A947-70E740481C1C}">
+                <a14:useLocalDpi xmlns:a14="http://schemas.microsoft.com/office/drawing/2010/main" val="0"/>
+              </a:ext>
+            </a:extLst>
+          </a:blip>
+          <a:srcRect l="2547" r="19318"/>
+          <a:stretch/>
+        </p:blipFill>
+        <p:spPr>
+          <a:xfrm>
+            <a:off x="2155971" y="4017881"/>
+            <a:ext cx="9526130" cy="1219200"/>
+          </a:xfrm>
+          <a:prstGeom prst="rect">
+            <a:avLst/>
+          </a:prstGeom>
+        </p:spPr>
+      </p:pic>
+      <p:sp>
+        <p:nvSpPr>
+          <p:cNvPr id="43" name="TextBox 42">
+            <a:extLst>
+              <a:ext uri="{FF2B5EF4-FFF2-40B4-BE49-F238E27FC236}">
+                <a16:creationId xmlns:a16="http://schemas.microsoft.com/office/drawing/2014/main" id="{5297A01D-6C66-417B-A863-7F2B3656716D}"/>
+              </a:ext>
+            </a:extLst>
+          </p:cNvPr>
+          <p:cNvSpPr txBox="1"/>
+          <p:nvPr/>
+        </p:nvSpPr>
+        <p:spPr>
+          <a:xfrm>
+            <a:off x="352337" y="2322128"/>
+            <a:ext cx="1602297" cy="369332"/>
+          </a:xfrm>
+          <a:prstGeom prst="rect">
+            <a:avLst/>
+          </a:prstGeom>
+          <a:noFill/>
+        </p:spPr>
+        <p:txBody>
+          <a:bodyPr wrap="square" rtlCol="0">
+            <a:spAutoFit/>
+          </a:bodyPr>
+          <a:lstStyle/>
+          <a:p>
+            <a:pPr algn="r"/>
+            <a:r>
+              <a:rPr lang="en-US" dirty="0"/>
+              <a:t>Input 2</a:t>
+            </a:r>
+          </a:p>
+        </p:txBody>
+      </p:sp>
+    </p:spTree>
+    <p:extLst>
+      <p:ext uri="{BB962C8B-B14F-4D97-AF65-F5344CB8AC3E}">
+        <p14:creationId xmlns:p14="http://schemas.microsoft.com/office/powerpoint/2010/main" val="2757863597"/>
+      </p:ext>
+    </p:extLst>
+  </p:cSld>
+  <p:clrMapOvr>
+    <a:masterClrMapping/>
+  </p:clrMapOvr>
+</p:sld>
+</file>
+
+<file path=ppt/slides/slide3.xml><?xml version="1.0" encoding="utf-8"?>
+<p:sld xmlns:a="http://schemas.openxmlformats.org/drawingml/2006/main" xmlns:r="http://schemas.openxmlformats.org/officeDocument/2006/relationships" xmlns:p="http://schemas.openxmlformats.org/presentationml/2006/main">
+  <p:cSld>
+    <p:spTree>
+      <p:nvGrpSpPr>
+        <p:cNvPr id="1" name=""/>
+        <p:cNvGrpSpPr/>
+        <p:nvPr/>
+      </p:nvGrpSpPr>
+      <p:grpSpPr>
+        <a:xfrm>
+          <a:off x="0" y="0"/>
+          <a:ext cx="0" cy="0"/>
+          <a:chOff x="0" y="0"/>
+          <a:chExt cx="0" cy="0"/>
+        </a:xfrm>
+      </p:grpSpPr>
+      <p:pic>
+        <p:nvPicPr>
+          <p:cNvPr id="3" name="Picture 2">
+            <a:extLst>
+              <a:ext uri="{FF2B5EF4-FFF2-40B4-BE49-F238E27FC236}">
+                <a16:creationId xmlns:a16="http://schemas.microsoft.com/office/drawing/2014/main" id="{1030EAE2-C595-422C-B965-FAB679940B7F}"/>
+              </a:ext>
+            </a:extLst>
+          </p:cNvPr>
+          <p:cNvPicPr>
+            <a:picLocks noChangeAspect="1"/>
+          </p:cNvPicPr>
+          <p:nvPr/>
+        </p:nvPicPr>
+        <p:blipFill>
+          <a:blip r:embed="rId2"/>
+          <a:stretch>
+            <a:fillRect/>
+          </a:stretch>
+        </p:blipFill>
+        <p:spPr>
+          <a:xfrm>
+            <a:off x="1189517" y="1778559"/>
+            <a:ext cx="9256647" cy="3300881"/>
+          </a:xfrm>
+          <a:prstGeom prst="rect">
+            <a:avLst/>
+          </a:prstGeom>
+        </p:spPr>
+      </p:pic>
+    </p:spTree>
+    <p:extLst>
+      <p:ext uri="{BB962C8B-B14F-4D97-AF65-F5344CB8AC3E}">
+        <p14:creationId xmlns:p14="http://schemas.microsoft.com/office/powerpoint/2010/main" val="4168429899"/>
+      </p:ext>
+    </p:extLst>
+  </p:cSld>
+  <p:clrMapOvr>
+    <a:masterClrMapping/>
+  </p:clrMapOvr>
+</p:sld>
+</file>
+
+<file path=ppt/slides/slide4.xml><?xml version="1.0" encoding="utf-8"?>
+<p:sld xmlns:a="http://schemas.openxmlformats.org/drawingml/2006/main" xmlns:r="http://schemas.openxmlformats.org/officeDocument/2006/relationships" xmlns:p="http://schemas.openxmlformats.org/presentationml/2006/main">
+  <p:cSld>
+    <p:spTree>
+      <p:nvGrpSpPr>
+        <p:cNvPr id="1" name=""/>
+        <p:cNvGrpSpPr/>
+        <p:nvPr/>
+      </p:nvGrpSpPr>
+      <p:grpSpPr>
+        <a:xfrm>
+          <a:off x="0" y="0"/>
+          <a:ext cx="0" cy="0"/>
+          <a:chOff x="0" y="0"/>
+          <a:chExt cx="0" cy="0"/>
+        </a:xfrm>
+      </p:grpSpPr>
+      <p:pic>
+        <p:nvPicPr>
+          <p:cNvPr id="7" name="Picture 6" descr="Chart, histogram&#10;&#10;Description automatically generated">
+            <a:extLst>
+              <a:ext uri="{FF2B5EF4-FFF2-40B4-BE49-F238E27FC236}">
+                <a16:creationId xmlns:a16="http://schemas.microsoft.com/office/drawing/2014/main" id="{053134B2-C4BE-4149-9735-D0FBC4555520}"/>
+              </a:ext>
+            </a:extLst>
+          </p:cNvPr>
+          <p:cNvPicPr>
+            <a:picLocks noChangeAspect="1"/>
+          </p:cNvPicPr>
+          <p:nvPr/>
+        </p:nvPicPr>
+        <p:blipFill>
+          <a:blip r:embed="rId2">
+            <a:extLst>
+              <a:ext uri="{28A0092B-C50C-407E-A947-70E740481C1C}">
+                <a14:useLocalDpi xmlns:a14="http://schemas.microsoft.com/office/drawing/2010/main" val="0"/>
+              </a:ext>
+            </a:extLst>
+          </a:blip>
+          <a:stretch>
+            <a:fillRect/>
+          </a:stretch>
+        </p:blipFill>
+        <p:spPr>
+          <a:xfrm>
+            <a:off x="771953" y="552550"/>
+            <a:ext cx="3680691" cy="2760518"/>
+          </a:xfrm>
+          <a:prstGeom prst="rect">
+            <a:avLst/>
+          </a:prstGeom>
+        </p:spPr>
+      </p:pic>
+      <p:pic>
+        <p:nvPicPr>
+          <p:cNvPr id="9" name="Picture 8" descr="Chart, histogram&#10;&#10;Description automatically generated">
+            <a:extLst>
+              <a:ext uri="{FF2B5EF4-FFF2-40B4-BE49-F238E27FC236}">
+                <a16:creationId xmlns:a16="http://schemas.microsoft.com/office/drawing/2014/main" id="{BF2B255E-76DD-4E97-A5D0-2245C64123EA}"/>
+              </a:ext>
+            </a:extLst>
+          </p:cNvPr>
+          <p:cNvPicPr>
+            <a:picLocks noChangeAspect="1"/>
+          </p:cNvPicPr>
+          <p:nvPr/>
+        </p:nvPicPr>
+        <p:blipFill>
+          <a:blip r:embed="rId3">
+            <a:extLst>
+              <a:ext uri="{28A0092B-C50C-407E-A947-70E740481C1C}">
+                <a14:useLocalDpi xmlns:a14="http://schemas.microsoft.com/office/drawing/2010/main" val="0"/>
+              </a:ext>
+            </a:extLst>
+          </a:blip>
+          <a:stretch>
+            <a:fillRect/>
+          </a:stretch>
+        </p:blipFill>
+        <p:spPr>
+          <a:xfrm>
+            <a:off x="861918" y="3313068"/>
+            <a:ext cx="3680691" cy="2760518"/>
+          </a:xfrm>
+          <a:prstGeom prst="rect">
+            <a:avLst/>
+          </a:prstGeom>
+        </p:spPr>
+      </p:pic>
+      <p:pic>
+        <p:nvPicPr>
+          <p:cNvPr id="11" name="Picture 10" descr="Chart, histogram&#10;&#10;Description automatically generated">
+            <a:extLst>
+              <a:ext uri="{FF2B5EF4-FFF2-40B4-BE49-F238E27FC236}">
+                <a16:creationId xmlns:a16="http://schemas.microsoft.com/office/drawing/2014/main" id="{FA6B529E-DC36-434B-9F3B-83BA584DF6C6}"/>
+              </a:ext>
+            </a:extLst>
+          </p:cNvPr>
+          <p:cNvPicPr>
+            <a:picLocks noChangeAspect="1"/>
+          </p:cNvPicPr>
+          <p:nvPr/>
+        </p:nvPicPr>
+        <p:blipFill>
+          <a:blip r:embed="rId4">
+            <a:extLst>
+              <a:ext uri="{28A0092B-C50C-407E-A947-70E740481C1C}">
+                <a14:useLocalDpi xmlns:a14="http://schemas.microsoft.com/office/drawing/2010/main" val="0"/>
+              </a:ext>
+            </a:extLst>
+          </a:blip>
+          <a:stretch>
+            <a:fillRect/>
+          </a:stretch>
+        </p:blipFill>
+        <p:spPr>
+          <a:xfrm>
+            <a:off x="5054704" y="552550"/>
+            <a:ext cx="3680691" cy="2760518"/>
+          </a:xfrm>
+          <a:prstGeom prst="rect">
+            <a:avLst/>
+          </a:prstGeom>
+        </p:spPr>
+      </p:pic>
+      <p:pic>
+        <p:nvPicPr>
+          <p:cNvPr id="6" name="Picture 5" descr="Chart, line chart&#10;&#10;Description automatically generated">
+            <a:extLst>
+              <a:ext uri="{FF2B5EF4-FFF2-40B4-BE49-F238E27FC236}">
+                <a16:creationId xmlns:a16="http://schemas.microsoft.com/office/drawing/2014/main" id="{81528359-9F9A-4D13-8DC5-759B8A77EFA8}"/>
+              </a:ext>
+            </a:extLst>
+          </p:cNvPr>
+          <p:cNvPicPr>
+            <a:picLocks noChangeAspect="1"/>
+          </p:cNvPicPr>
+          <p:nvPr/>
+        </p:nvPicPr>
+        <p:blipFill>
+          <a:blip r:embed="rId5">
+            <a:extLst>
+              <a:ext uri="{28A0092B-C50C-407E-A947-70E740481C1C}">
+                <a14:useLocalDpi xmlns:a14="http://schemas.microsoft.com/office/drawing/2010/main" val="0"/>
+              </a:ext>
+            </a:extLst>
+          </a:blip>
+          <a:stretch>
+            <a:fillRect/>
+          </a:stretch>
+        </p:blipFill>
+        <p:spPr>
+          <a:xfrm>
+            <a:off x="5054703" y="3242388"/>
+            <a:ext cx="3774931" cy="2831198"/>
+          </a:xfrm>
+          <a:prstGeom prst="rect">
+            <a:avLst/>
+          </a:prstGeom>
+        </p:spPr>
+      </p:pic>
+    </p:spTree>
+    <p:extLst>
+      <p:ext uri="{BB962C8B-B14F-4D97-AF65-F5344CB8AC3E}">
+        <p14:creationId xmlns:p14="http://schemas.microsoft.com/office/powerpoint/2010/main" val="2837804752"/>
+      </p:ext>
+    </p:extLst>
+  </p:cSld>
+  <p:clrMapOvr>
+    <a:masterClrMapping/>
+  </p:clrMapOvr>
+</p:sld>
+</file>
+
+<file path=ppt/slides/slide5.xml><?xml version="1.0" encoding="utf-8"?>
+<p:sld xmlns:a="http://schemas.openxmlformats.org/drawingml/2006/main" xmlns:r="http://schemas.openxmlformats.org/officeDocument/2006/relationships" xmlns:p="http://schemas.openxmlformats.org/presentationml/2006/main">
+  <p:cSld>
+    <p:spTree>
+      <p:nvGrpSpPr>
+        <p:cNvPr id="1" name=""/>
+        <p:cNvGrpSpPr/>
+        <p:nvPr/>
+      </p:nvGrpSpPr>
+      <p:grpSpPr>
+        <a:xfrm>
+          <a:off x="0" y="0"/>
+          <a:ext cx="0" cy="0"/>
+          <a:chOff x="0" y="0"/>
+          <a:chExt cx="0" cy="0"/>
+        </a:xfrm>
+      </p:grpSpPr>
+      <p:sp>
+        <p:nvSpPr>
+          <p:cNvPr id="21" name="TextBox 20">
+            <a:extLst>
+              <a:ext uri="{FF2B5EF4-FFF2-40B4-BE49-F238E27FC236}">
+                <a16:creationId xmlns:a16="http://schemas.microsoft.com/office/drawing/2014/main" id="{A9472E1E-4F8C-4A3E-A737-0CBBEB80BB33}"/>
+              </a:ext>
+            </a:extLst>
+          </p:cNvPr>
+          <p:cNvSpPr txBox="1"/>
+          <p:nvPr/>
+        </p:nvSpPr>
+        <p:spPr>
+          <a:xfrm>
+            <a:off x="1015069" y="5821209"/>
+            <a:ext cx="3548542" cy="369332"/>
+          </a:xfrm>
+          <a:prstGeom prst="rect">
+            <a:avLst/>
+          </a:prstGeom>
+          <a:noFill/>
+        </p:spPr>
+        <p:txBody>
+          <a:bodyPr wrap="square" rtlCol="0">
+            <a:spAutoFit/>
+          </a:bodyPr>
+          <a:lstStyle/>
+          <a:p>
+            <a:r>
+              <a:rPr lang="en-US" dirty="0"/>
+              <a:t>Epochs 18 – 20 (out of 20)</a:t>
+            </a:r>
+          </a:p>
+        </p:txBody>
+      </p:sp>
+      <p:pic>
+        <p:nvPicPr>
+          <p:cNvPr id="24" name="Picture 23" descr="Table&#10;&#10;Description automatically generated">
+            <a:extLst>
+              <a:ext uri="{FF2B5EF4-FFF2-40B4-BE49-F238E27FC236}">
+                <a16:creationId xmlns:a16="http://schemas.microsoft.com/office/drawing/2014/main" id="{CEDD3463-A204-4DC7-8EE5-4A9F4871A865}"/>
+              </a:ext>
+            </a:extLst>
+          </p:cNvPr>
+          <p:cNvPicPr>
+            <a:picLocks noChangeAspect="1"/>
+          </p:cNvPicPr>
+          <p:nvPr/>
+        </p:nvPicPr>
+        <p:blipFill rotWithShape="1">
+          <a:blip r:embed="rId2">
+            <a:extLst>
+              <a:ext uri="{28A0092B-C50C-407E-A947-70E740481C1C}">
+                <a14:useLocalDpi xmlns:a14="http://schemas.microsoft.com/office/drawing/2010/main" val="0"/>
+              </a:ext>
+            </a:extLst>
+          </a:blip>
+          <a:srcRect t="7951" b="79163"/>
+          <a:stretch/>
+        </p:blipFill>
+        <p:spPr>
+          <a:xfrm>
+            <a:off x="114090" y="575179"/>
+            <a:ext cx="6651808" cy="2142853"/>
+          </a:xfrm>
+          <a:prstGeom prst="rect">
+            <a:avLst/>
+          </a:prstGeom>
+        </p:spPr>
+      </p:pic>
+      <p:pic>
+        <p:nvPicPr>
+          <p:cNvPr id="26" name="Picture 25" descr="Chart&#10;&#10;Description automatically generated">
+            <a:extLst>
+              <a:ext uri="{FF2B5EF4-FFF2-40B4-BE49-F238E27FC236}">
+                <a16:creationId xmlns:a16="http://schemas.microsoft.com/office/drawing/2014/main" id="{C6FADD83-645F-428A-8CF1-FFE71F55AA86}"/>
+              </a:ext>
+            </a:extLst>
+          </p:cNvPr>
+          <p:cNvPicPr>
+            <a:picLocks noChangeAspect="1"/>
+          </p:cNvPicPr>
+          <p:nvPr/>
+        </p:nvPicPr>
+        <p:blipFill>
+          <a:blip r:embed="rId3">
+            <a:extLst>
+              <a:ext uri="{28A0092B-C50C-407E-A947-70E740481C1C}">
+                <a14:useLocalDpi xmlns:a14="http://schemas.microsoft.com/office/drawing/2010/main" val="0"/>
+              </a:ext>
+            </a:extLst>
+          </a:blip>
+          <a:stretch>
+            <a:fillRect/>
+          </a:stretch>
+        </p:blipFill>
+        <p:spPr>
+          <a:xfrm>
+            <a:off x="6627301" y="575179"/>
+            <a:ext cx="4637155" cy="3477866"/>
+          </a:xfrm>
+          <a:prstGeom prst="rect">
+            <a:avLst/>
+          </a:prstGeom>
+        </p:spPr>
+      </p:pic>
+      <p:pic>
+        <p:nvPicPr>
+          <p:cNvPr id="29" name="Picture 28" descr="Table&#10;&#10;Description automatically generated">
+            <a:extLst>
+              <a:ext uri="{FF2B5EF4-FFF2-40B4-BE49-F238E27FC236}">
+                <a16:creationId xmlns:a16="http://schemas.microsoft.com/office/drawing/2014/main" id="{4ADAFDDA-E3A2-4E29-92A4-EFFBB08BFC1C}"/>
+              </a:ext>
+            </a:extLst>
+          </p:cNvPr>
+          <p:cNvPicPr>
+            <a:picLocks noChangeAspect="1"/>
+          </p:cNvPicPr>
+          <p:nvPr/>
+        </p:nvPicPr>
+        <p:blipFill rotWithShape="1">
+          <a:blip r:embed="rId2">
+            <a:extLst>
+              <a:ext uri="{28A0092B-C50C-407E-A947-70E740481C1C}">
+                <a14:useLocalDpi xmlns:a14="http://schemas.microsoft.com/office/drawing/2010/main" val="0"/>
+              </a:ext>
+            </a:extLst>
+          </a:blip>
+          <a:srcRect t="76421" b="11541"/>
+          <a:stretch/>
+        </p:blipFill>
+        <p:spPr>
+          <a:xfrm>
+            <a:off x="189591" y="3531765"/>
+            <a:ext cx="6651808" cy="2001843"/>
+          </a:xfrm>
+          <a:prstGeom prst="rect">
+            <a:avLst/>
+          </a:prstGeom>
+        </p:spPr>
+      </p:pic>
+      <p:sp>
+        <p:nvSpPr>
+          <p:cNvPr id="31" name="TextBox 30">
+            <a:extLst>
+              <a:ext uri="{FF2B5EF4-FFF2-40B4-BE49-F238E27FC236}">
+                <a16:creationId xmlns:a16="http://schemas.microsoft.com/office/drawing/2014/main" id="{0A4A4EC0-31C7-4FFC-9B8D-05BC817C11A5}"/>
+              </a:ext>
+            </a:extLst>
+          </p:cNvPr>
+          <p:cNvSpPr txBox="1"/>
+          <p:nvPr/>
+        </p:nvSpPr>
+        <p:spPr>
+          <a:xfrm>
+            <a:off x="1015069" y="2776113"/>
+            <a:ext cx="3548542" cy="369332"/>
+          </a:xfrm>
+          <a:prstGeom prst="rect">
+            <a:avLst/>
+          </a:prstGeom>
+          <a:noFill/>
+        </p:spPr>
+        <p:txBody>
+          <a:bodyPr wrap="square" rtlCol="0">
+            <a:spAutoFit/>
+          </a:bodyPr>
+          <a:lstStyle/>
+          <a:p>
+            <a:r>
+              <a:rPr lang="en-US" dirty="0"/>
+              <a:t>Epochs 1 – 3 (out of 20)</a:t>
+            </a:r>
+          </a:p>
+        </p:txBody>
+      </p:sp>
+      <p:sp>
+        <p:nvSpPr>
+          <p:cNvPr id="33" name="TextBox 32">
+            <a:extLst>
+              <a:ext uri="{FF2B5EF4-FFF2-40B4-BE49-F238E27FC236}">
+                <a16:creationId xmlns:a16="http://schemas.microsoft.com/office/drawing/2014/main" id="{1A4942B8-EFA0-4379-89B4-DE1BA0D6367A}"/>
+              </a:ext>
+            </a:extLst>
+          </p:cNvPr>
+          <p:cNvSpPr txBox="1"/>
+          <p:nvPr/>
+        </p:nvSpPr>
+        <p:spPr>
+          <a:xfrm>
+            <a:off x="7233408" y="4776223"/>
+            <a:ext cx="3076662" cy="369332"/>
+          </a:xfrm>
+          <a:prstGeom prst="rect">
+            <a:avLst/>
+          </a:prstGeom>
+          <a:noFill/>
+        </p:spPr>
+        <p:txBody>
+          <a:bodyPr wrap="square">
+            <a:spAutoFit/>
+          </a:bodyPr>
+          <a:lstStyle/>
+          <a:p>
+            <a:r>
+              <a:rPr lang="en-US" dirty="0"/>
+              <a:t>last </a:t>
+            </a:r>
+            <a:r>
+              <a:rPr lang="en-US" dirty="0" err="1"/>
+              <a:t>test_loss</a:t>
+            </a:r>
+            <a:r>
+              <a:rPr lang="en-US" dirty="0"/>
+              <a:t>: [0.00376571]</a:t>
+            </a:r>
+          </a:p>
+        </p:txBody>
+      </p:sp>
+    </p:spTree>
+    <p:extLst>
+      <p:ext uri="{BB962C8B-B14F-4D97-AF65-F5344CB8AC3E}">
+        <p14:creationId xmlns:p14="http://schemas.microsoft.com/office/powerpoint/2010/main" val="2056680780"/>
+      </p:ext>
+    </p:extLst>
+  </p:cSld>
+  <p:clrMapOvr>
+    <a:masterClrMapping/>
+  </p:clrMapOvr>
+</p:sld>
+</file>
+
+<file path=ppt/slides/slide6.xml><?xml version="1.0" encoding="utf-8"?>
+<p:sld xmlns:a="http://schemas.openxmlformats.org/drawingml/2006/main" xmlns:r="http://schemas.openxmlformats.org/officeDocument/2006/relationships" xmlns:p="http://schemas.openxmlformats.org/presentationml/2006/main">
+  <p:cSld>
+    <p:spTree>
+      <p:nvGrpSpPr>
+        <p:cNvPr id="1" name=""/>
+        <p:cNvGrpSpPr/>
+        <p:nvPr/>
+      </p:nvGrpSpPr>
+      <p:grpSpPr>
+        <a:xfrm>
+          <a:off x="0" y="0"/>
+          <a:ext cx="0" cy="0"/>
+          <a:chOff x="0" y="0"/>
+          <a:chExt cx="0" cy="0"/>
+        </a:xfrm>
+      </p:grpSpPr>
+      <p:pic>
+        <p:nvPicPr>
+          <p:cNvPr id="3" name="Picture 2" descr="Chart, line chart&#10;&#10;Description automatically generated">
+            <a:extLst>
+              <a:ext uri="{FF2B5EF4-FFF2-40B4-BE49-F238E27FC236}">
+                <a16:creationId xmlns:a16="http://schemas.microsoft.com/office/drawing/2014/main" id="{DC808DEF-2C71-4158-8F9F-762EC360627C}"/>
+              </a:ext>
+            </a:extLst>
+          </p:cNvPr>
+          <p:cNvPicPr>
+            <a:picLocks noChangeAspect="1"/>
+          </p:cNvPicPr>
+          <p:nvPr/>
+        </p:nvPicPr>
+        <p:blipFill>
+          <a:blip r:embed="rId2">
+            <a:extLst>
+              <a:ext uri="{28A0092B-C50C-407E-A947-70E740481C1C}">
+                <a14:useLocalDpi xmlns:a14="http://schemas.microsoft.com/office/drawing/2010/main" val="0"/>
+              </a:ext>
+            </a:extLst>
+          </a:blip>
+          <a:stretch>
+            <a:fillRect/>
+          </a:stretch>
+        </p:blipFill>
+        <p:spPr>
+          <a:xfrm>
+            <a:off x="904496" y="458758"/>
+            <a:ext cx="3680691" cy="2760518"/>
+          </a:xfrm>
+          <a:prstGeom prst="rect">
+            <a:avLst/>
+          </a:prstGeom>
+        </p:spPr>
+      </p:pic>
+      <p:pic>
+        <p:nvPicPr>
+          <p:cNvPr id="10" name="Picture 9" descr="Chart, histogram&#10;&#10;Description automatically generated">
+            <a:extLst>
+              <a:ext uri="{FF2B5EF4-FFF2-40B4-BE49-F238E27FC236}">
+                <a16:creationId xmlns:a16="http://schemas.microsoft.com/office/drawing/2014/main" id="{9193A23C-AA20-4A97-9AD3-0FEE4491450B}"/>
+              </a:ext>
+            </a:extLst>
+          </p:cNvPr>
+          <p:cNvPicPr>
+            <a:picLocks noChangeAspect="1"/>
+          </p:cNvPicPr>
+          <p:nvPr/>
+        </p:nvPicPr>
+        <p:blipFill>
+          <a:blip r:embed="rId3">
+            <a:extLst>
+              <a:ext uri="{28A0092B-C50C-407E-A947-70E740481C1C}">
+                <a14:useLocalDpi xmlns:a14="http://schemas.microsoft.com/office/drawing/2010/main" val="0"/>
+              </a:ext>
+            </a:extLst>
+          </a:blip>
+          <a:stretch>
+            <a:fillRect/>
+          </a:stretch>
+        </p:blipFill>
+        <p:spPr>
+          <a:xfrm>
+            <a:off x="5292335" y="458758"/>
+            <a:ext cx="3680691" cy="2760518"/>
+          </a:xfrm>
+          <a:prstGeom prst="rect">
+            <a:avLst/>
+          </a:prstGeom>
+        </p:spPr>
+      </p:pic>
+      <p:pic>
+        <p:nvPicPr>
+          <p:cNvPr id="15" name="Picture 14" descr="Chart, line chart, histogram&#10;&#10;Description automatically generated">
+            <a:extLst>
+              <a:ext uri="{FF2B5EF4-FFF2-40B4-BE49-F238E27FC236}">
+                <a16:creationId xmlns:a16="http://schemas.microsoft.com/office/drawing/2014/main" id="{3CEA089D-0CB7-4712-85E2-7655EC7656B2}"/>
+              </a:ext>
+            </a:extLst>
+          </p:cNvPr>
+          <p:cNvPicPr>
+            <a:picLocks noChangeAspect="1"/>
+          </p:cNvPicPr>
+          <p:nvPr/>
+        </p:nvPicPr>
+        <p:blipFill>
+          <a:blip r:embed="rId4">
+            <a:extLst>
+              <a:ext uri="{28A0092B-C50C-407E-A947-70E740481C1C}">
+                <a14:useLocalDpi xmlns:a14="http://schemas.microsoft.com/office/drawing/2010/main" val="0"/>
+              </a:ext>
+            </a:extLst>
+          </a:blip>
+          <a:stretch>
+            <a:fillRect/>
+          </a:stretch>
+        </p:blipFill>
+        <p:spPr>
+          <a:xfrm>
+            <a:off x="822681" y="3357934"/>
+            <a:ext cx="3799893" cy="2849919"/>
+          </a:xfrm>
+          <a:prstGeom prst="rect">
+            <a:avLst/>
+          </a:prstGeom>
+        </p:spPr>
+      </p:pic>
+    </p:spTree>
+    <p:extLst>
+      <p:ext uri="{BB962C8B-B14F-4D97-AF65-F5344CB8AC3E}">
+        <p14:creationId xmlns:p14="http://schemas.microsoft.com/office/powerpoint/2010/main" val="909874794"/>
+      </p:ext>
+    </p:extLst>
+  </p:cSld>
+  <p:clrMapOvr>
+    <a:masterClrMapping/>
+  </p:clrMapOvr>
+</p:sld>
+</file>
+
 <file path=ppt/theme/theme1.xml><?xml version="1.0" encoding="utf-8"?>
 <a:theme xmlns:a="http://schemas.openxmlformats.org/drawingml/2006/main" name="Office Theme">
   <a:themeElements>

</xml_diff>